<commit_message>
Face-face PPT and NIEM3 models
</commit_message>
<xml_diff>
--- a/Team/Threat-risk process.pptx
+++ b/Team/Threat-risk process.pptx
@@ -5,7 +5,7 @@
     <p:sldMasterId id="2147483660" r:id="rId1"/>
   </p:sldMasterIdLst>
   <p:notesMasterIdLst>
-    <p:notesMasterId r:id="rId28"/>
+    <p:notesMasterId r:id="rId29"/>
   </p:notesMasterIdLst>
   <p:sldIdLst>
     <p:sldId id="256" r:id="rId2"/>
@@ -34,6 +34,7 @@
     <p:sldId id="280" r:id="rId25"/>
     <p:sldId id="283" r:id="rId26"/>
     <p:sldId id="282" r:id="rId27"/>
+    <p:sldId id="284" r:id="rId28"/>
   </p:sldIdLst>
   <p:sldSz cx="9144000" cy="6858000" type="screen4x3"/>
   <p:notesSz cx="6858000" cy="9144000"/>
@@ -217,7 +218,7 @@
           <a:p>
             <a:fld id="{AC180C8A-D2E4-4495-AF9F-052BC1FF86BD}" type="datetimeFigureOut">
               <a:rPr lang="en-US" smtClean="0"/>
-              <a:t>1/12/2015</a:t>
+              <a:t>1/13/2015</a:t>
             </a:fld>
             <a:endParaRPr lang="en-US"/>
           </a:p>
@@ -805,7 +806,7 @@
           <a:p>
             <a:fld id="{DE50E6FA-C16A-45A0-90AF-AC44915B4985}" type="datetime1">
               <a:rPr lang="en-US" smtClean="0"/>
-              <a:t>1/12/2015</a:t>
+              <a:t>1/13/2015</a:t>
             </a:fld>
             <a:endParaRPr lang="en-US"/>
           </a:p>
@@ -1094,7 +1095,7 @@
           <a:p>
             <a:fld id="{EF9C7C0E-76AF-4C03-A32F-9BE7A876349D}" type="datetime1">
               <a:rPr lang="en-US" smtClean="0"/>
-              <a:t>1/12/2015</a:t>
+              <a:t>1/13/2015</a:t>
             </a:fld>
             <a:endParaRPr lang="en-US"/>
           </a:p>
@@ -1321,7 +1322,7 @@
           <a:p>
             <a:fld id="{33BBAE57-11FF-46AD-A45D-E7FFCA9C548C}" type="datetime1">
               <a:rPr lang="en-US" smtClean="0"/>
-              <a:t>1/12/2015</a:t>
+              <a:t>1/13/2015</a:t>
             </a:fld>
             <a:endParaRPr lang="en-US"/>
           </a:p>
@@ -1780,7 +1781,7 @@
           <a:p>
             <a:fld id="{1F9A5793-53E3-4EFA-8FEB-3135A2F5C16E}" type="datetime1">
               <a:rPr lang="en-US" smtClean="0"/>
-              <a:t>1/12/2015</a:t>
+              <a:t>1/13/2015</a:t>
             </a:fld>
             <a:endParaRPr lang="en-US" dirty="0"/>
           </a:p>
@@ -2071,7 +2072,7 @@
           <a:p>
             <a:fld id="{7FFC8E0D-FE22-42CA-9D02-05162CCF70A3}" type="datetime1">
               <a:rPr lang="en-US" smtClean="0"/>
-              <a:t>1/12/2015</a:t>
+              <a:t>1/13/2015</a:t>
             </a:fld>
             <a:endParaRPr lang="en-US"/>
           </a:p>
@@ -2548,7 +2549,7 @@
           <a:p>
             <a:fld id="{BE80ADE7-DD84-48A6-A0E5-4A13B3316DE6}" type="datetime1">
               <a:rPr lang="en-US" smtClean="0"/>
-              <a:t>1/12/2015</a:t>
+              <a:t>1/13/2015</a:t>
             </a:fld>
             <a:endParaRPr lang="en-US"/>
           </a:p>
@@ -3007,7 +3008,7 @@
           <a:p>
             <a:fld id="{BD67D7B8-0974-4C85-AD6F-E3AA752C474C}" type="datetime1">
               <a:rPr lang="en-US" smtClean="0"/>
-              <a:t>1/12/2015</a:t>
+              <a:t>1/13/2015</a:t>
             </a:fld>
             <a:endParaRPr lang="en-US"/>
           </a:p>
@@ -3149,7 +3150,7 @@
           <a:p>
             <a:fld id="{F178AD1E-6C62-4F7B-8F5C-AB7BDAD6E1C9}" type="datetime1">
               <a:rPr lang="en-US" smtClean="0"/>
-              <a:t>1/12/2015</a:t>
+              <a:t>1/13/2015</a:t>
             </a:fld>
             <a:endParaRPr lang="en-US"/>
           </a:p>
@@ -3314,7 +3315,7 @@
           <a:p>
             <a:fld id="{80D17477-C76C-4732-A7CD-6CBB12E31B18}" type="datetime1">
               <a:rPr lang="en-US" smtClean="0"/>
-              <a:t>1/12/2015</a:t>
+              <a:t>1/13/2015</a:t>
             </a:fld>
             <a:endParaRPr lang="en-US"/>
           </a:p>
@@ -3712,7 +3713,7 @@
           <a:p>
             <a:fld id="{71F48243-A7BF-4D4D-8DAB-E3F038F0C710}" type="datetime1">
               <a:rPr lang="en-US" smtClean="0"/>
-              <a:t>1/12/2015</a:t>
+              <a:t>1/13/2015</a:t>
             </a:fld>
             <a:endParaRPr lang="en-US"/>
           </a:p>
@@ -4116,7 +4117,7 @@
           <a:p>
             <a:fld id="{D1B94B25-3499-4F72-85E7-1F6B1C0EDEDB}" type="datetime1">
               <a:rPr lang="en-US" smtClean="0"/>
-              <a:t>1/12/2015</a:t>
+              <a:t>1/13/2015</a:t>
             </a:fld>
             <a:endParaRPr lang="en-US"/>
           </a:p>
@@ -4330,7 +4331,7 @@
           <a:p>
             <a:fld id="{F14817DA-5A00-4BC5-A59B-5083A6F74273}" type="datetime1">
               <a:rPr lang="en-US" smtClean="0"/>
-              <a:t>1/12/2015</a:t>
+              <a:t>1/13/2015</a:t>
             </a:fld>
             <a:endParaRPr lang="en-US"/>
           </a:p>
@@ -5490,7 +5491,7 @@
           <a:p>
             <a:fld id="{B7991BA1-B39D-47ED-BA61-18D81BEA49A7}" type="datetime1">
               <a:rPr lang="en-US" smtClean="0"/>
-              <a:t>1/12/2015</a:t>
+              <a:t>1/13/2015</a:t>
             </a:fld>
             <a:endParaRPr lang="en-US" dirty="0"/>
           </a:p>
@@ -5619,11 +5620,7 @@
           <a:p>
             <a:r>
               <a:rPr lang="en-US" dirty="0" smtClean="0"/>
-              <a:t>Time </a:t>
-            </a:r>
-            <a:r>
-              <a:rPr lang="en-US" dirty="0" smtClean="0"/>
-              <a:t>Investment Required</a:t>
+              <a:t>Time Investment Required</a:t>
             </a:r>
             <a:endParaRPr lang="en-US" dirty="0"/>
           </a:p>
@@ -5676,7 +5673,7 @@
           <a:p>
             <a:fld id="{C12638B0-881F-4BC7-8102-A0BD7FCB8347}" type="datetime1">
               <a:rPr lang="en-US" smtClean="0"/>
-              <a:t>1/12/2015</a:t>
+              <a:t>1/13/2015</a:t>
             </a:fld>
             <a:endParaRPr lang="en-US"/>
           </a:p>
@@ -5906,7 +5903,7 @@
           <a:p>
             <a:fld id="{7FFC8E0D-FE22-42CA-9D02-05162CCF70A3}" type="datetime1">
               <a:rPr lang="en-US" smtClean="0"/>
-              <a:t>1/12/2015</a:t>
+              <a:t>1/13/2015</a:t>
             </a:fld>
             <a:endParaRPr lang="en-US"/>
           </a:p>
@@ -6094,7 +6091,7 @@
           <a:p>
             <a:fld id="{E6350277-05A2-400E-AC73-10721334E494}" type="datetime1">
               <a:rPr lang="en-US" smtClean="0"/>
-              <a:t>1/12/2015</a:t>
+              <a:t>1/13/2015</a:t>
             </a:fld>
             <a:endParaRPr lang="en-US" dirty="0"/>
           </a:p>
@@ -6270,7 +6267,7 @@
           <a:p>
             <a:fld id="{FFE0A703-7594-4AD9-A0F3-5C3095207437}" type="datetime1">
               <a:rPr lang="en-US" smtClean="0"/>
-              <a:t>1/12/2015</a:t>
+              <a:t>1/13/2015</a:t>
             </a:fld>
             <a:endParaRPr lang="en-US" dirty="0"/>
           </a:p>
@@ -7140,7 +7137,7 @@
           <a:p>
             <a:fld id="{C676F5ED-0E4C-40AB-B07F-608DABCD2DA7}" type="datetime1">
               <a:rPr lang="en-US" smtClean="0"/>
-              <a:t>1/12/2015</a:t>
+              <a:t>1/13/2015</a:t>
             </a:fld>
             <a:endParaRPr lang="en-US"/>
           </a:p>
@@ -7347,7 +7344,7 @@
           <a:p>
             <a:fld id="{BF54636A-89CA-427A-B5CF-AAB9E5E68CCB}" type="datetime1">
               <a:rPr lang="en-US" smtClean="0"/>
-              <a:t>1/12/2015</a:t>
+              <a:t>1/13/2015</a:t>
             </a:fld>
             <a:endParaRPr lang="en-US" dirty="0"/>
           </a:p>
@@ -7533,7 +7530,7 @@
           <a:p>
             <a:fld id="{6BAEF988-70A3-4FDF-8F54-08E8E8C96878}" type="datetime1">
               <a:rPr lang="en-US" smtClean="0"/>
-              <a:t>1/12/2015</a:t>
+              <a:t>1/13/2015</a:t>
             </a:fld>
             <a:endParaRPr lang="en-US" dirty="0"/>
           </a:p>
@@ -7725,7 +7722,7 @@
           <a:p>
             <a:fld id="{29A64E8B-282C-4032-B500-A01B23482823}" type="datetime1">
               <a:rPr lang="en-US" smtClean="0"/>
-              <a:t>1/12/2015</a:t>
+              <a:t>1/13/2015</a:t>
             </a:fld>
             <a:endParaRPr lang="en-US" dirty="0"/>
           </a:p>
@@ -7924,7 +7921,7 @@
           <a:p>
             <a:fld id="{E4704B7D-3708-41F0-8B71-D48F95DD10D4}" type="datetime1">
               <a:rPr lang="en-US" smtClean="0"/>
-              <a:t>1/12/2015</a:t>
+              <a:t>1/13/2015</a:t>
             </a:fld>
             <a:endParaRPr lang="en-US" dirty="0"/>
           </a:p>
@@ -8055,7 +8052,7 @@
           <a:p>
             <a:fld id="{ACAED5A1-FBF5-454F-B76F-C46EB28405E2}" type="datetime1">
               <a:rPr lang="en-US" smtClean="0"/>
-              <a:t>1/12/2015</a:t>
+              <a:t>1/13/2015</a:t>
             </a:fld>
             <a:endParaRPr lang="en-US" dirty="0"/>
           </a:p>
@@ -8267,7 +8264,7 @@
           <a:p>
             <a:fld id="{62A0943E-F0AF-4B03-9AED-391DE19F8E6B}" type="datetime1">
               <a:rPr lang="en-US" smtClean="0"/>
-              <a:t>1/12/2015</a:t>
+              <a:t>1/13/2015</a:t>
             </a:fld>
             <a:endParaRPr lang="en-US" dirty="0"/>
           </a:p>
@@ -8419,7 +8416,7 @@
           <a:p>
             <a:fld id="{6FBCC5FD-8B1D-453E-BCB3-0E72A3ECD44D}" type="datetime1">
               <a:rPr lang="en-US" smtClean="0"/>
-              <a:t>1/12/2015</a:t>
+              <a:t>1/13/2015</a:t>
             </a:fld>
             <a:endParaRPr lang="en-US" dirty="0"/>
           </a:p>
@@ -8567,7 +8564,7 @@
           <a:p>
             <a:fld id="{0D6FB540-4C15-4588-86FF-E19E95913DD3}" type="datetime1">
               <a:rPr lang="en-US" smtClean="0"/>
-              <a:t>1/12/2015</a:t>
+              <a:t>1/13/2015</a:t>
             </a:fld>
             <a:endParaRPr lang="en-US"/>
           </a:p>
@@ -8704,7 +8701,7 @@
           <a:p>
             <a:fld id="{7FFC8E0D-FE22-42CA-9D02-05162CCF70A3}" type="datetime1">
               <a:rPr lang="en-US" smtClean="0"/>
-              <a:t>1/12/2015</a:t>
+              <a:t>1/13/2015</a:t>
             </a:fld>
             <a:endParaRPr lang="en-US"/>
           </a:p>
@@ -8942,7 +8939,7 @@
           <a:p>
             <a:fld id="{1F9A5793-53E3-4EFA-8FEB-3135A2F5C16E}" type="datetime1">
               <a:rPr lang="en-US" smtClean="0"/>
-              <a:t>1/12/2015</a:t>
+              <a:t>1/13/2015</a:t>
             </a:fld>
             <a:endParaRPr lang="en-US" dirty="0"/>
           </a:p>
@@ -9227,7 +9224,7 @@
           <a:p>
             <a:fld id="{1F9A5793-53E3-4EFA-8FEB-3135A2F5C16E}" type="datetime1">
               <a:rPr lang="en-US" smtClean="0"/>
-              <a:t>1/12/2015</a:t>
+              <a:t>1/13/2015</a:t>
             </a:fld>
             <a:endParaRPr lang="en-US" dirty="0"/>
           </a:p>
@@ -9775,6 +9772,171 @@
 </p:sld>
 </file>
 
+<file path=ppt/slides/slide27.xml><?xml version="1.0" encoding="utf-8"?>
+<p:sld xmlns:a="http://schemas.openxmlformats.org/drawingml/2006/main" xmlns:r="http://schemas.openxmlformats.org/officeDocument/2006/relationships" xmlns:p="http://schemas.openxmlformats.org/presentationml/2006/main">
+  <p:cSld>
+    <p:spTree>
+      <p:nvGrpSpPr>
+        <p:cNvPr id="1" name=""/>
+        <p:cNvGrpSpPr/>
+        <p:nvPr/>
+      </p:nvGrpSpPr>
+      <p:grpSpPr>
+        <a:xfrm>
+          <a:off x="0" y="0"/>
+          <a:ext cx="0" cy="0"/>
+          <a:chOff x="0" y="0"/>
+          <a:chExt cx="0" cy="0"/>
+        </a:xfrm>
+      </p:grpSpPr>
+      <p:sp>
+        <p:nvSpPr>
+          <p:cNvPr id="2" name="Date Placeholder 1"/>
+          <p:cNvSpPr>
+            <a:spLocks noGrp="1"/>
+          </p:cNvSpPr>
+          <p:nvPr>
+            <p:ph type="dt" sz="half" idx="10"/>
+          </p:nvPr>
+        </p:nvSpPr>
+        <p:spPr/>
+        <p:txBody>
+          <a:bodyPr/>
+          <a:lstStyle/>
+          <a:p>
+            <a:fld id="{F178AD1E-6C62-4F7B-8F5C-AB7BDAD6E1C9}" type="datetime1">
+              <a:rPr lang="en-US" smtClean="0"/>
+              <a:t>1/13/2015</a:t>
+            </a:fld>
+            <a:endParaRPr lang="en-US"/>
+          </a:p>
+        </p:txBody>
+      </p:sp>
+      <p:sp>
+        <p:nvSpPr>
+          <p:cNvPr id="3" name="Slide Number Placeholder 2"/>
+          <p:cNvSpPr>
+            <a:spLocks noGrp="1"/>
+          </p:cNvSpPr>
+          <p:nvPr>
+            <p:ph type="sldNum" sz="quarter" idx="11"/>
+          </p:nvPr>
+        </p:nvSpPr>
+        <p:spPr/>
+        <p:txBody>
+          <a:bodyPr/>
+          <a:lstStyle/>
+          <a:p>
+            <a:fld id="{C5349D12-3EF0-44B0-8484-0F10BE0E01DA}" type="slidenum">
+              <a:rPr lang="en-US" smtClean="0"/>
+              <a:t>27</a:t>
+            </a:fld>
+            <a:endParaRPr lang="en-US"/>
+          </a:p>
+        </p:txBody>
+      </p:sp>
+      <p:sp>
+        <p:nvSpPr>
+          <p:cNvPr id="4" name="Footer Placeholder 3"/>
+          <p:cNvSpPr>
+            <a:spLocks noGrp="1"/>
+          </p:cNvSpPr>
+          <p:nvPr>
+            <p:ph type="ftr" sz="quarter" idx="12"/>
+          </p:nvPr>
+        </p:nvSpPr>
+        <p:spPr/>
+        <p:txBody>
+          <a:bodyPr/>
+          <a:lstStyle/>
+          <a:p>
+            <a:r>
+              <a:rPr lang="en-US" smtClean="0"/>
+              <a:t>Threat &amp; Risk</a:t>
+            </a:r>
+            <a:endParaRPr lang="en-US"/>
+          </a:p>
+        </p:txBody>
+      </p:sp>
+      <p:sp>
+        <p:nvSpPr>
+          <p:cNvPr id="5" name="Title 4"/>
+          <p:cNvSpPr>
+            <a:spLocks noGrp="1"/>
+          </p:cNvSpPr>
+          <p:nvPr>
+            <p:ph type="title"/>
+          </p:nvPr>
+        </p:nvSpPr>
+        <p:spPr/>
+        <p:txBody>
+          <a:bodyPr>
+            <a:normAutofit fontScale="90000"/>
+          </a:bodyPr>
+          <a:lstStyle/>
+          <a:p>
+            <a:r>
+              <a:rPr lang="en-US" dirty="0" smtClean="0"/>
+              <a:t>Consider the technology readiness level required for any pilots/prototypes</a:t>
+            </a:r>
+            <a:endParaRPr lang="en-US" dirty="0"/>
+          </a:p>
+        </p:txBody>
+      </p:sp>
+      <p:pic>
+        <p:nvPicPr>
+          <p:cNvPr id="2050" name="Picture 2" descr="http://upload.wikimedia.org/wikipedia/commons/7/72/NASA_TRL_Meter.jpg"/>
+          <p:cNvPicPr>
+            <a:picLocks noChangeAspect="1" noChangeArrowheads="1"/>
+          </p:cNvPicPr>
+          <p:nvPr/>
+        </p:nvPicPr>
+        <p:blipFill>
+          <a:blip r:embed="rId2">
+            <a:extLst>
+              <a:ext uri="{28A0092B-C50C-407E-A947-70E740481C1C}">
+                <a14:useLocalDpi xmlns:a14="http://schemas.microsoft.com/office/drawing/2010/main" val="0"/>
+              </a:ext>
+            </a:extLst>
+          </a:blip>
+          <a:srcRect/>
+          <a:stretch>
+            <a:fillRect/>
+          </a:stretch>
+        </p:blipFill>
+        <p:spPr bwMode="auto">
+          <a:xfrm>
+            <a:off x="2819400" y="1600200"/>
+            <a:ext cx="2533650" cy="4095750"/>
+          </a:xfrm>
+          <a:prstGeom prst="rect">
+            <a:avLst/>
+          </a:prstGeom>
+          <a:noFill/>
+          <a:extLst>
+            <a:ext uri="{909E8E84-426E-40DD-AFC4-6F175D3DCCD1}">
+              <a14:hiddenFill xmlns:a14="http://schemas.microsoft.com/office/drawing/2010/main">
+                <a:solidFill>
+                  <a:srgbClr val="FFFFFF"/>
+                </a:solidFill>
+              </a14:hiddenFill>
+            </a:ext>
+          </a:extLst>
+        </p:spPr>
+      </p:pic>
+    </p:spTree>
+    <p:extLst>
+      <p:ext uri="{BB962C8B-B14F-4D97-AF65-F5344CB8AC3E}">
+        <p14:creationId xmlns:p14="http://schemas.microsoft.com/office/powerpoint/2010/main" val="682176504"/>
+      </p:ext>
+    </p:extLst>
+  </p:cSld>
+  <p:clrMapOvr>
+    <a:masterClrMapping/>
+  </p:clrMapOvr>
+</p:sld>
+</file>
+
 <file path=ppt/slides/slide3.xml><?xml version="1.0" encoding="utf-8"?>
 <p:sld xmlns:a="http://schemas.openxmlformats.org/drawingml/2006/main" xmlns:r="http://schemas.openxmlformats.org/officeDocument/2006/relationships" xmlns:p="http://schemas.openxmlformats.org/presentationml/2006/main">
   <p:cSld>
@@ -9881,7 +10043,7 @@
           <a:p>
             <a:fld id="{A544E6C8-7DCE-405E-9AEF-8787E2234D8F}" type="datetime1">
               <a:rPr lang="en-US" smtClean="0"/>
-              <a:t>1/12/2015</a:t>
+              <a:t>1/13/2015</a:t>
             </a:fld>
             <a:endParaRPr lang="en-US" dirty="0"/>
           </a:p>
@@ -10053,7 +10215,7 @@
           <a:p>
             <a:fld id="{07E2A2A4-D9A6-4E21-985C-F3B9A48DF01F}" type="datetime1">
               <a:rPr lang="en-US" smtClean="0"/>
-              <a:t>1/12/2015</a:t>
+              <a:t>1/13/2015</a:t>
             </a:fld>
             <a:endParaRPr lang="en-US" dirty="0"/>
           </a:p>
@@ -10201,7 +10363,7 @@
           <a:p>
             <a:fld id="{91D7FAE9-9780-47C1-809A-7DD43688ACF3}" type="datetime1">
               <a:rPr lang="en-US" smtClean="0"/>
-              <a:t>1/12/2015</a:t>
+              <a:t>1/13/2015</a:t>
             </a:fld>
             <a:endParaRPr lang="en-US"/>
           </a:p>
@@ -10429,7 +10591,7 @@
           <a:p>
             <a:fld id="{6F3CE05D-8528-45E2-BAF1-4C3CBE666D60}" type="datetime1">
               <a:rPr lang="en-US" smtClean="0"/>
-              <a:t>1/12/2015</a:t>
+              <a:t>1/13/2015</a:t>
             </a:fld>
             <a:endParaRPr lang="en-US" dirty="0"/>
           </a:p>
@@ -10654,7 +10816,7 @@
           <a:p>
             <a:fld id="{BC5DE813-49F2-4C94-8639-905BD8C14B55}" type="datetime1">
               <a:rPr lang="en-US" smtClean="0"/>
-              <a:t>1/12/2015</a:t>
+              <a:t>1/13/2015</a:t>
             </a:fld>
             <a:endParaRPr lang="en-US" dirty="0"/>
           </a:p>
@@ -10874,7 +11036,7 @@
           <a:p>
             <a:fld id="{ACD7FFE9-ADF2-4BCD-81A0-0D4E51B22F79}" type="datetime1">
               <a:rPr lang="en-US" smtClean="0"/>
-              <a:t>1/12/2015</a:t>
+              <a:t>1/13/2015</a:t>
             </a:fld>
             <a:endParaRPr lang="en-US" dirty="0"/>
           </a:p>
@@ -11110,7 +11272,7 @@
           <a:p>
             <a:fld id="{CACCDEEC-E241-4C94-9849-F8205DB16981}" type="datetime1">
               <a:rPr lang="en-US" smtClean="0"/>
-              <a:t>1/12/2015</a:t>
+              <a:t>1/13/2015</a:t>
             </a:fld>
             <a:endParaRPr lang="en-US" dirty="0"/>
           </a:p>

</xml_diff>